<commit_message>
[ANV] an updated plan for the paper de-scoping
</commit_message>
<xml_diff>
--- a/notes/anthony/nrFanoPaper_logic_descope.pptx
+++ b/notes/anthony/nrFanoPaper_logic_descope.pptx
@@ -4,12 +4,16 @@
   <p:sldMasterIdLst>
     <p:sldMasterId id="2147483648" r:id="rId1"/>
   </p:sldMasterIdLst>
+  <p:notesMasterIdLst>
+    <p:notesMasterId r:id="rId8"/>
+  </p:notesMasterIdLst>
   <p:sldIdLst>
     <p:sldId id="256" r:id="rId2"/>
     <p:sldId id="257" r:id="rId3"/>
     <p:sldId id="258" r:id="rId4"/>
     <p:sldId id="259" r:id="rId5"/>
-    <p:sldId id="260" r:id="rId6"/>
+    <p:sldId id="261" r:id="rId6"/>
+    <p:sldId id="260" r:id="rId7"/>
   </p:sldIdLst>
   <p:sldSz cx="12192000" cy="6858000"/>
   <p:notesSz cx="6858000" cy="9144000"/>
@@ -116,6 +120,355 @@
 </p:presentation>
 </file>
 
+<file path=ppt/notesMasters/notesMaster1.xml><?xml version="1.0" encoding="utf-8"?>
+<p:notesMaster xmlns:a="http://schemas.openxmlformats.org/drawingml/2006/main" xmlns:r="http://schemas.openxmlformats.org/officeDocument/2006/relationships" xmlns:p="http://schemas.openxmlformats.org/presentationml/2006/main">
+  <p:cSld>
+    <p:bg>
+      <p:bgRef idx="1001">
+        <a:schemeClr val="bg1"/>
+      </p:bgRef>
+    </p:bg>
+    <p:spTree>
+      <p:nvGrpSpPr>
+        <p:cNvPr id="1" name=""/>
+        <p:cNvGrpSpPr/>
+        <p:nvPr/>
+      </p:nvGrpSpPr>
+      <p:grpSpPr>
+        <a:xfrm>
+          <a:off x="0" y="0"/>
+          <a:ext cx="0" cy="0"/>
+          <a:chOff x="0" y="0"/>
+          <a:chExt cx="0" cy="0"/>
+        </a:xfrm>
+      </p:grpSpPr>
+      <p:sp>
+        <p:nvSpPr>
+          <p:cNvPr id="2" name="Header Placeholder 1"/>
+          <p:cNvSpPr>
+            <a:spLocks noGrp="1"/>
+          </p:cNvSpPr>
+          <p:nvPr>
+            <p:ph type="hdr" sz="quarter"/>
+          </p:nvPr>
+        </p:nvSpPr>
+        <p:spPr>
+          <a:xfrm>
+            <a:off x="0" y="0"/>
+            <a:ext cx="2971800" cy="458788"/>
+          </a:xfrm>
+          <a:prstGeom prst="rect">
+            <a:avLst/>
+          </a:prstGeom>
+        </p:spPr>
+        <p:txBody>
+          <a:bodyPr vert="horz" lIns="91440" tIns="45720" rIns="91440" bIns="45720" rtlCol="0"/>
+          <a:lstStyle>
+            <a:lvl1pPr algn="l">
+              <a:defRPr sz="1200"/>
+            </a:lvl1pPr>
+          </a:lstStyle>
+          <a:p>
+            <a:endParaRPr lang="en-US"/>
+          </a:p>
+        </p:txBody>
+      </p:sp>
+      <p:sp>
+        <p:nvSpPr>
+          <p:cNvPr id="3" name="Date Placeholder 2"/>
+          <p:cNvSpPr>
+            <a:spLocks noGrp="1"/>
+          </p:cNvSpPr>
+          <p:nvPr>
+            <p:ph type="dt" idx="1"/>
+          </p:nvPr>
+        </p:nvSpPr>
+        <p:spPr>
+          <a:xfrm>
+            <a:off x="3884613" y="0"/>
+            <a:ext cx="2971800" cy="458788"/>
+          </a:xfrm>
+          <a:prstGeom prst="rect">
+            <a:avLst/>
+          </a:prstGeom>
+        </p:spPr>
+        <p:txBody>
+          <a:bodyPr vert="horz" lIns="91440" tIns="45720" rIns="91440" bIns="45720" rtlCol="0"/>
+          <a:lstStyle>
+            <a:lvl1pPr algn="r">
+              <a:defRPr sz="1200"/>
+            </a:lvl1pPr>
+          </a:lstStyle>
+          <a:p>
+            <a:fld id="{BB5F6868-0175-7E41-B9C5-E775BA425A81}" type="datetimeFigureOut">
+              <a:rPr lang="en-US" smtClean="0"/>
+              <a:t>5/10/19</a:t>
+            </a:fld>
+            <a:endParaRPr lang="en-US"/>
+          </a:p>
+        </p:txBody>
+      </p:sp>
+      <p:sp>
+        <p:nvSpPr>
+          <p:cNvPr id="4" name="Slide Image Placeholder 3"/>
+          <p:cNvSpPr>
+            <a:spLocks noGrp="1" noRot="1" noChangeAspect="1"/>
+          </p:cNvSpPr>
+          <p:nvPr>
+            <p:ph type="sldImg" idx="2"/>
+          </p:nvPr>
+        </p:nvSpPr>
+        <p:spPr>
+          <a:xfrm>
+            <a:off x="685800" y="1143000"/>
+            <a:ext cx="5486400" cy="3086100"/>
+          </a:xfrm>
+          <a:prstGeom prst="rect">
+            <a:avLst/>
+          </a:prstGeom>
+          <a:noFill/>
+          <a:ln w="12700">
+            <a:solidFill>
+              <a:prstClr val="black"/>
+            </a:solidFill>
+          </a:ln>
+        </p:spPr>
+        <p:txBody>
+          <a:bodyPr vert="horz" lIns="91440" tIns="45720" rIns="91440" bIns="45720" rtlCol="0" anchor="ctr"/>
+          <a:lstStyle/>
+          <a:p>
+            <a:endParaRPr lang="en-US"/>
+          </a:p>
+        </p:txBody>
+      </p:sp>
+      <p:sp>
+        <p:nvSpPr>
+          <p:cNvPr id="5" name="Notes Placeholder 4"/>
+          <p:cNvSpPr>
+            <a:spLocks noGrp="1"/>
+          </p:cNvSpPr>
+          <p:nvPr>
+            <p:ph type="body" sz="quarter" idx="3"/>
+          </p:nvPr>
+        </p:nvSpPr>
+        <p:spPr>
+          <a:xfrm>
+            <a:off x="685800" y="4400550"/>
+            <a:ext cx="5486400" cy="3600450"/>
+          </a:xfrm>
+          <a:prstGeom prst="rect">
+            <a:avLst/>
+          </a:prstGeom>
+        </p:spPr>
+        <p:txBody>
+          <a:bodyPr vert="horz" lIns="91440" tIns="45720" rIns="91440" bIns="45720" rtlCol="0"/>
+          <a:lstStyle/>
+          <a:p>
+            <a:pPr lvl="0"/>
+            <a:r>
+              <a:rPr lang="en-US"/>
+              <a:t>Click to edit Master text styles</a:t>
+            </a:r>
+          </a:p>
+          <a:p>
+            <a:pPr lvl="1"/>
+            <a:r>
+              <a:rPr lang="en-US"/>
+              <a:t>Second level</a:t>
+            </a:r>
+          </a:p>
+          <a:p>
+            <a:pPr lvl="2"/>
+            <a:r>
+              <a:rPr lang="en-US"/>
+              <a:t>Third level</a:t>
+            </a:r>
+          </a:p>
+          <a:p>
+            <a:pPr lvl="3"/>
+            <a:r>
+              <a:rPr lang="en-US"/>
+              <a:t>Fourth level</a:t>
+            </a:r>
+          </a:p>
+          <a:p>
+            <a:pPr lvl="4"/>
+            <a:r>
+              <a:rPr lang="en-US"/>
+              <a:t>Fifth level</a:t>
+            </a:r>
+          </a:p>
+        </p:txBody>
+      </p:sp>
+      <p:sp>
+        <p:nvSpPr>
+          <p:cNvPr id="6" name="Footer Placeholder 5"/>
+          <p:cNvSpPr>
+            <a:spLocks noGrp="1"/>
+          </p:cNvSpPr>
+          <p:nvPr>
+            <p:ph type="ftr" sz="quarter" idx="4"/>
+          </p:nvPr>
+        </p:nvSpPr>
+        <p:spPr>
+          <a:xfrm>
+            <a:off x="0" y="8685213"/>
+            <a:ext cx="2971800" cy="458787"/>
+          </a:xfrm>
+          <a:prstGeom prst="rect">
+            <a:avLst/>
+          </a:prstGeom>
+        </p:spPr>
+        <p:txBody>
+          <a:bodyPr vert="horz" lIns="91440" tIns="45720" rIns="91440" bIns="45720" rtlCol="0" anchor="b"/>
+          <a:lstStyle>
+            <a:lvl1pPr algn="l">
+              <a:defRPr sz="1200"/>
+            </a:lvl1pPr>
+          </a:lstStyle>
+          <a:p>
+            <a:endParaRPr lang="en-US"/>
+          </a:p>
+        </p:txBody>
+      </p:sp>
+      <p:sp>
+        <p:nvSpPr>
+          <p:cNvPr id="7" name="Slide Number Placeholder 6"/>
+          <p:cNvSpPr>
+            <a:spLocks noGrp="1"/>
+          </p:cNvSpPr>
+          <p:nvPr>
+            <p:ph type="sldNum" sz="quarter" idx="5"/>
+          </p:nvPr>
+        </p:nvSpPr>
+        <p:spPr>
+          <a:xfrm>
+            <a:off x="3884613" y="8685213"/>
+            <a:ext cx="2971800" cy="458787"/>
+          </a:xfrm>
+          <a:prstGeom prst="rect">
+            <a:avLst/>
+          </a:prstGeom>
+        </p:spPr>
+        <p:txBody>
+          <a:bodyPr vert="horz" lIns="91440" tIns="45720" rIns="91440" bIns="45720" rtlCol="0" anchor="b"/>
+          <a:lstStyle>
+            <a:lvl1pPr algn="r">
+              <a:defRPr sz="1200"/>
+            </a:lvl1pPr>
+          </a:lstStyle>
+          <a:p>
+            <a:fld id="{2F3A1DDE-D0E7-C94F-8D17-8294848B55C8}" type="slidenum">
+              <a:rPr lang="en-US" smtClean="0"/>
+              <a:t>‹#›</a:t>
+            </a:fld>
+            <a:endParaRPr lang="en-US"/>
+          </a:p>
+        </p:txBody>
+      </p:sp>
+    </p:spTree>
+    <p:extLst>
+      <p:ext uri="{BB962C8B-B14F-4D97-AF65-F5344CB8AC3E}">
+        <p14:creationId xmlns:p14="http://schemas.microsoft.com/office/powerpoint/2010/main" val="3716230722"/>
+      </p:ext>
+    </p:extLst>
+  </p:cSld>
+  <p:clrMap bg1="lt1" tx1="dk1" bg2="lt2" tx2="dk2" accent1="accent1" accent2="accent2" accent3="accent3" accent4="accent4" accent5="accent5" accent6="accent6" hlink="hlink" folHlink="folHlink"/>
+  <p:notesStyle>
+    <a:lvl1pPr marL="0" algn="l" defTabSz="914400" rtl="0" eaLnBrk="1" latinLnBrk="0" hangingPunct="1">
+      <a:defRPr sz="1200" kern="1200">
+        <a:solidFill>
+          <a:schemeClr val="tx1"/>
+        </a:solidFill>
+        <a:latin typeface="+mn-lt"/>
+        <a:ea typeface="+mn-ea"/>
+        <a:cs typeface="+mn-cs"/>
+      </a:defRPr>
+    </a:lvl1pPr>
+    <a:lvl2pPr marL="457200" algn="l" defTabSz="914400" rtl="0" eaLnBrk="1" latinLnBrk="0" hangingPunct="1">
+      <a:defRPr sz="1200" kern="1200">
+        <a:solidFill>
+          <a:schemeClr val="tx1"/>
+        </a:solidFill>
+        <a:latin typeface="+mn-lt"/>
+        <a:ea typeface="+mn-ea"/>
+        <a:cs typeface="+mn-cs"/>
+      </a:defRPr>
+    </a:lvl2pPr>
+    <a:lvl3pPr marL="914400" algn="l" defTabSz="914400" rtl="0" eaLnBrk="1" latinLnBrk="0" hangingPunct="1">
+      <a:defRPr sz="1200" kern="1200">
+        <a:solidFill>
+          <a:schemeClr val="tx1"/>
+        </a:solidFill>
+        <a:latin typeface="+mn-lt"/>
+        <a:ea typeface="+mn-ea"/>
+        <a:cs typeface="+mn-cs"/>
+      </a:defRPr>
+    </a:lvl3pPr>
+    <a:lvl4pPr marL="1371600" algn="l" defTabSz="914400" rtl="0" eaLnBrk="1" latinLnBrk="0" hangingPunct="1">
+      <a:defRPr sz="1200" kern="1200">
+        <a:solidFill>
+          <a:schemeClr val="tx1"/>
+        </a:solidFill>
+        <a:latin typeface="+mn-lt"/>
+        <a:ea typeface="+mn-ea"/>
+        <a:cs typeface="+mn-cs"/>
+      </a:defRPr>
+    </a:lvl4pPr>
+    <a:lvl5pPr marL="1828800" algn="l" defTabSz="914400" rtl="0" eaLnBrk="1" latinLnBrk="0" hangingPunct="1">
+      <a:defRPr sz="1200" kern="1200">
+        <a:solidFill>
+          <a:schemeClr val="tx1"/>
+        </a:solidFill>
+        <a:latin typeface="+mn-lt"/>
+        <a:ea typeface="+mn-ea"/>
+        <a:cs typeface="+mn-cs"/>
+      </a:defRPr>
+    </a:lvl5pPr>
+    <a:lvl6pPr marL="2286000" algn="l" defTabSz="914400" rtl="0" eaLnBrk="1" latinLnBrk="0" hangingPunct="1">
+      <a:defRPr sz="1200" kern="1200">
+        <a:solidFill>
+          <a:schemeClr val="tx1"/>
+        </a:solidFill>
+        <a:latin typeface="+mn-lt"/>
+        <a:ea typeface="+mn-ea"/>
+        <a:cs typeface="+mn-cs"/>
+      </a:defRPr>
+    </a:lvl6pPr>
+    <a:lvl7pPr marL="2743200" algn="l" defTabSz="914400" rtl="0" eaLnBrk="1" latinLnBrk="0" hangingPunct="1">
+      <a:defRPr sz="1200" kern="1200">
+        <a:solidFill>
+          <a:schemeClr val="tx1"/>
+        </a:solidFill>
+        <a:latin typeface="+mn-lt"/>
+        <a:ea typeface="+mn-ea"/>
+        <a:cs typeface="+mn-cs"/>
+      </a:defRPr>
+    </a:lvl7pPr>
+    <a:lvl8pPr marL="3200400" algn="l" defTabSz="914400" rtl="0" eaLnBrk="1" latinLnBrk="0" hangingPunct="1">
+      <a:defRPr sz="1200" kern="1200">
+        <a:solidFill>
+          <a:schemeClr val="tx1"/>
+        </a:solidFill>
+        <a:latin typeface="+mn-lt"/>
+        <a:ea typeface="+mn-ea"/>
+        <a:cs typeface="+mn-cs"/>
+      </a:defRPr>
+    </a:lvl8pPr>
+    <a:lvl9pPr marL="3657600" algn="l" defTabSz="914400" rtl="0" eaLnBrk="1" latinLnBrk="0" hangingPunct="1">
+      <a:defRPr sz="1200" kern="1200">
+        <a:solidFill>
+          <a:schemeClr val="tx1"/>
+        </a:solidFill>
+        <a:latin typeface="+mn-lt"/>
+        <a:ea typeface="+mn-ea"/>
+        <a:cs typeface="+mn-cs"/>
+      </a:defRPr>
+    </a:lvl9pPr>
+  </p:notesStyle>
+</p:notesMaster>
+</file>
+
 <file path=ppt/slideLayouts/slideLayout1.xml><?xml version="1.0" encoding="utf-8"?>
 <p:sldLayout xmlns:a="http://schemas.openxmlformats.org/drawingml/2006/main" xmlns:r="http://schemas.openxmlformats.org/officeDocument/2006/relationships" xmlns:p="http://schemas.openxmlformats.org/presentationml/2006/main" type="title" preserve="1">
   <p:cSld name="Title Slide">
@@ -261,7 +614,7 @@
           <a:bodyPr/>
           <a:lstStyle/>
           <a:p>
-            <a:fld id="{542A4B59-5918-EA42-8C30-5F731BD35FB1}" type="datetimeFigureOut">
+            <a:fld id="{33BD9691-8DCE-A84A-BF04-E67E49E06190}" type="datetime1">
               <a:rPr lang="en-US" smtClean="0"/>
               <a:t>5/10/19</a:t>
             </a:fld>
@@ -459,7 +812,7 @@
           <a:bodyPr/>
           <a:lstStyle/>
           <a:p>
-            <a:fld id="{542A4B59-5918-EA42-8C30-5F731BD35FB1}" type="datetimeFigureOut">
+            <a:fld id="{2A1002F9-80B1-6546-A51F-2372C06E0240}" type="datetime1">
               <a:rPr lang="en-US" smtClean="0"/>
               <a:t>5/10/19</a:t>
             </a:fld>
@@ -667,7 +1020,7 @@
           <a:bodyPr/>
           <a:lstStyle/>
           <a:p>
-            <a:fld id="{542A4B59-5918-EA42-8C30-5F731BD35FB1}" type="datetimeFigureOut">
+            <a:fld id="{3E735172-B221-FA40-84E1-599993F0153B}" type="datetime1">
               <a:rPr lang="en-US" smtClean="0"/>
               <a:t>5/10/19</a:t>
             </a:fld>
@@ -865,7 +1218,7 @@
           <a:bodyPr/>
           <a:lstStyle/>
           <a:p>
-            <a:fld id="{542A4B59-5918-EA42-8C30-5F731BD35FB1}" type="datetimeFigureOut">
+            <a:fld id="{7AEAA56A-086C-D749-A593-B56811DB8E48}" type="datetime1">
               <a:rPr lang="en-US" smtClean="0"/>
               <a:t>5/10/19</a:t>
             </a:fld>
@@ -1140,7 +1493,7 @@
           <a:bodyPr/>
           <a:lstStyle/>
           <a:p>
-            <a:fld id="{542A4B59-5918-EA42-8C30-5F731BD35FB1}" type="datetimeFigureOut">
+            <a:fld id="{C9C61955-9122-2C46-9131-2147A3863113}" type="datetime1">
               <a:rPr lang="en-US" smtClean="0"/>
               <a:t>5/10/19</a:t>
             </a:fld>
@@ -1405,7 +1758,7 @@
           <a:bodyPr/>
           <a:lstStyle/>
           <a:p>
-            <a:fld id="{542A4B59-5918-EA42-8C30-5F731BD35FB1}" type="datetimeFigureOut">
+            <a:fld id="{8D2E7482-19F6-FA42-B82E-B23AE68A6B7E}" type="datetime1">
               <a:rPr lang="en-US" smtClean="0"/>
               <a:t>5/10/19</a:t>
             </a:fld>
@@ -1817,7 +2170,7 @@
           <a:bodyPr/>
           <a:lstStyle/>
           <a:p>
-            <a:fld id="{542A4B59-5918-EA42-8C30-5F731BD35FB1}" type="datetimeFigureOut">
+            <a:fld id="{6BA48EE3-E164-7E44-A2A5-00772BCBAC36}" type="datetime1">
               <a:rPr lang="en-US" smtClean="0"/>
               <a:t>5/10/19</a:t>
             </a:fld>
@@ -1958,7 +2311,7 @@
           <a:bodyPr/>
           <a:lstStyle/>
           <a:p>
-            <a:fld id="{542A4B59-5918-EA42-8C30-5F731BD35FB1}" type="datetimeFigureOut">
+            <a:fld id="{C07D7128-4214-7F41-A8F4-339D80F49597}" type="datetime1">
               <a:rPr lang="en-US" smtClean="0"/>
               <a:t>5/10/19</a:t>
             </a:fld>
@@ -2071,7 +2424,7 @@
           <a:bodyPr/>
           <a:lstStyle/>
           <a:p>
-            <a:fld id="{542A4B59-5918-EA42-8C30-5F731BD35FB1}" type="datetimeFigureOut">
+            <a:fld id="{AB704316-F31F-2C4E-8689-0D1DAF3AAF0B}" type="datetime1">
               <a:rPr lang="en-US" smtClean="0"/>
               <a:t>5/10/19</a:t>
             </a:fld>
@@ -2382,7 +2735,7 @@
           <a:bodyPr/>
           <a:lstStyle/>
           <a:p>
-            <a:fld id="{542A4B59-5918-EA42-8C30-5F731BD35FB1}" type="datetimeFigureOut">
+            <a:fld id="{0D2303A5-371F-374C-867F-CD22FE36AF67}" type="datetime1">
               <a:rPr lang="en-US" smtClean="0"/>
               <a:t>5/10/19</a:t>
             </a:fld>
@@ -2670,7 +3023,7 @@
           <a:bodyPr/>
           <a:lstStyle/>
           <a:p>
-            <a:fld id="{542A4B59-5918-EA42-8C30-5F731BD35FB1}" type="datetimeFigureOut">
+            <a:fld id="{52C091F7-3F24-E64A-8CB0-5EBDB4EFC34E}" type="datetime1">
               <a:rPr lang="en-US" smtClean="0"/>
               <a:t>5/10/19</a:t>
             </a:fld>
@@ -2911,7 +3264,7 @@
             </a:lvl1pPr>
           </a:lstStyle>
           <a:p>
-            <a:fld id="{542A4B59-5918-EA42-8C30-5F731BD35FB1}" type="datetimeFigureOut">
+            <a:fld id="{C11FD886-C52C-1140-837A-BB686E96D305}" type="datetime1">
               <a:rPr lang="en-US" smtClean="0"/>
               <a:t>5/10/19</a:t>
             </a:fld>
@@ -3030,6 +3383,7 @@
     <p:sldLayoutId id="2147483658" r:id="rId10"/>
     <p:sldLayoutId id="2147483659" r:id="rId11"/>
   </p:sldLayoutIdLst>
+  <p:hf hdr="0" ftr="0" dt="0"/>
   <p:txStyles>
     <p:titleStyle>
       <a:lvl1pPr algn="l" defTabSz="914400" rtl="0" eaLnBrk="1" latinLnBrk="0" hangingPunct="1">
@@ -3392,6 +3746,35 @@
           </a:p>
         </p:txBody>
       </p:sp>
+      <p:sp>
+        <p:nvSpPr>
+          <p:cNvPr id="4" name="Slide Number Placeholder 3">
+            <a:extLst>
+              <a:ext uri="{FF2B5EF4-FFF2-40B4-BE49-F238E27FC236}">
+                <a16:creationId xmlns:a16="http://schemas.microsoft.com/office/drawing/2014/main" id="{6A45346B-22FB-4F42-98E8-D8C81A834530}"/>
+              </a:ext>
+            </a:extLst>
+          </p:cNvPr>
+          <p:cNvSpPr>
+            <a:spLocks noGrp="1"/>
+          </p:cNvSpPr>
+          <p:nvPr>
+            <p:ph type="sldNum" sz="quarter" idx="12"/>
+          </p:nvPr>
+        </p:nvSpPr>
+        <p:spPr/>
+        <p:txBody>
+          <a:bodyPr/>
+          <a:lstStyle/>
+          <a:p>
+            <a:fld id="{9635BD54-6FD1-A547-8020-DE8D1AE33416}" type="slidenum">
+              <a:rPr lang="en-US" smtClean="0"/>
+              <a:t>1</a:t>
+            </a:fld>
+            <a:endParaRPr lang="en-US"/>
+          </a:p>
+        </p:txBody>
+      </p:sp>
     </p:spTree>
     <p:extLst>
       <p:ext uri="{BB962C8B-B14F-4D97-AF65-F5344CB8AC3E}">
@@ -3537,6 +3920,35 @@
           </a:p>
         </p:txBody>
       </p:sp>
+      <p:sp>
+        <p:nvSpPr>
+          <p:cNvPr id="4" name="Slide Number Placeholder 3">
+            <a:extLst>
+              <a:ext uri="{FF2B5EF4-FFF2-40B4-BE49-F238E27FC236}">
+                <a16:creationId xmlns:a16="http://schemas.microsoft.com/office/drawing/2014/main" id="{9E13332E-6B90-E742-AD2A-8298F075E300}"/>
+              </a:ext>
+            </a:extLst>
+          </p:cNvPr>
+          <p:cNvSpPr>
+            <a:spLocks noGrp="1"/>
+          </p:cNvSpPr>
+          <p:nvPr>
+            <p:ph type="sldNum" sz="quarter" idx="12"/>
+          </p:nvPr>
+        </p:nvSpPr>
+        <p:spPr/>
+        <p:txBody>
+          <a:bodyPr/>
+          <a:lstStyle/>
+          <a:p>
+            <a:fld id="{9635BD54-6FD1-A547-8020-DE8D1AE33416}" type="slidenum">
+              <a:rPr lang="en-US" smtClean="0"/>
+              <a:t>2</a:t>
+            </a:fld>
+            <a:endParaRPr lang="en-US"/>
+          </a:p>
+        </p:txBody>
+      </p:sp>
     </p:spTree>
     <p:extLst>
       <p:ext uri="{BB962C8B-B14F-4D97-AF65-F5344CB8AC3E}">
@@ -3595,232 +4007,269 @@
           </a:p>
         </p:txBody>
       </p:sp>
-      <p:sp>
-        <p:nvSpPr>
-          <p:cNvPr id="3" name="TextBox 2">
-            <a:extLst>
-              <a:ext uri="{FF2B5EF4-FFF2-40B4-BE49-F238E27FC236}">
-                <a16:creationId xmlns:a16="http://schemas.microsoft.com/office/drawing/2014/main" id="{E75A5DD0-7A67-A943-9F4D-77B67FDA397C}"/>
-              </a:ext>
-            </a:extLst>
-          </p:cNvPr>
-          <p:cNvSpPr txBox="1"/>
-          <p:nvPr/>
-        </p:nvSpPr>
-        <p:spPr>
-          <a:xfrm>
-            <a:off x="838200" y="1690688"/>
-            <a:ext cx="10545323" cy="4247317"/>
-          </a:xfrm>
-          <a:prstGeom prst="rect">
-            <a:avLst/>
-          </a:prstGeom>
-          <a:noFill/>
-        </p:spPr>
-        <p:txBody>
-          <a:bodyPr wrap="none" rtlCol="0">
-            <a:spAutoFit/>
-          </a:bodyPr>
-          <a:lstStyle/>
-          <a:p>
-            <a:pPr marL="342900" indent="-342900">
-              <a:buFont typeface="+mj-lt"/>
-              <a:buAutoNum type="arabicPeriod"/>
-            </a:pPr>
-            <a:r>
-              <a:rPr lang="en-US" dirty="0"/>
-              <a:t>Introduction to resolutions and importance</a:t>
-            </a:r>
-          </a:p>
-          <a:p>
-            <a:pPr marL="342900" indent="-342900">
-              <a:buFont typeface="+mj-lt"/>
-              <a:buAutoNum type="arabicPeriod"/>
-            </a:pPr>
-            <a:r>
-              <a:rPr lang="en-US" dirty="0">
-                <a:solidFill>
-                  <a:schemeClr val="accent6"/>
-                </a:solidFill>
-              </a:rPr>
-              <a:t>Comparison of Dougherty data and </a:t>
-            </a:r>
-            <a:r>
-              <a:rPr lang="en-US" dirty="0" err="1">
-                <a:solidFill>
-                  <a:schemeClr val="accent6"/>
-                </a:solidFill>
-              </a:rPr>
-              <a:t>Lindhard</a:t>
-            </a:r>
-            <a:r>
-              <a:rPr lang="en-US" dirty="0">
-                <a:solidFill>
-                  <a:schemeClr val="accent6"/>
-                </a:solidFill>
-              </a:rPr>
-              <a:t> variance </a:t>
-            </a:r>
-          </a:p>
-          <a:p>
-            <a:pPr marL="342900" indent="-342900">
-              <a:buFont typeface="+mj-lt"/>
-              <a:buAutoNum type="arabicPeriod"/>
-            </a:pPr>
-            <a:r>
-              <a:rPr lang="en-US" dirty="0"/>
-              <a:t>Extraction of Edelweiss “F” </a:t>
-            </a:r>
-          </a:p>
-          <a:p>
-            <a:pPr marL="342900" indent="-342900">
-              <a:buFont typeface="+mj-lt"/>
-              <a:buAutoNum type="arabicPeriod"/>
-            </a:pPr>
-            <a:r>
-              <a:rPr lang="en-US" dirty="0"/>
-              <a:t>Error estimation on ”C” </a:t>
-            </a:r>
-          </a:p>
-          <a:p>
-            <a:pPr marL="342900" indent="-342900">
-              <a:buFont typeface="+mj-lt"/>
-              <a:buAutoNum type="arabicPeriod"/>
-            </a:pPr>
-            <a:r>
-              <a:rPr lang="en-US" dirty="0"/>
-              <a:t>Analytical </a:t>
-            </a:r>
-            <a:r>
-              <a:rPr lang="en-US" dirty="0" err="1"/>
-              <a:t>calcs</a:t>
-            </a:r>
-            <a:r>
-              <a:rPr lang="en-US" dirty="0"/>
-              <a:t> for </a:t>
-            </a:r>
-            <a:r>
-              <a:rPr lang="en-US" dirty="0" err="1"/>
-              <a:t>Enr</a:t>
-            </a:r>
-            <a:r>
-              <a:rPr lang="en-US" dirty="0"/>
-              <a:t>-yield plane bands for CDMS/Edw. </a:t>
-            </a:r>
-          </a:p>
-          <a:p>
-            <a:pPr marL="342900" indent="-342900">
-              <a:buFont typeface="+mj-lt"/>
-              <a:buAutoNum type="arabicPeriod"/>
-            </a:pPr>
-            <a:r>
-              <a:rPr lang="en-US" dirty="0"/>
-              <a:t>Text and analysis of MS simulations</a:t>
-            </a:r>
-          </a:p>
-          <a:p>
-            <a:pPr marL="342900" indent="-342900">
-              <a:buFont typeface="+mj-lt"/>
-              <a:buAutoNum type="arabicPeriod"/>
-            </a:pPr>
-            <a:r>
-              <a:rPr lang="en-US" dirty="0"/>
-              <a:t>Comparison of ER band containment fraction from generated data and analytical </a:t>
-            </a:r>
-            <a:r>
-              <a:rPr lang="en-US" dirty="0" err="1"/>
-              <a:t>calcs</a:t>
-            </a:r>
-            <a:r>
-              <a:rPr lang="en-US" dirty="0"/>
-              <a:t>. For various Fer? </a:t>
-            </a:r>
-          </a:p>
-          <a:p>
-            <a:pPr marL="342900" indent="-342900">
-              <a:buFont typeface="+mj-lt"/>
-              <a:buAutoNum type="arabicPeriod"/>
-            </a:pPr>
-            <a:r>
-              <a:rPr lang="en-US" dirty="0"/>
-              <a:t>With CDMS/</a:t>
-            </a:r>
-            <a:r>
-              <a:rPr lang="en-US" dirty="0" err="1"/>
-              <a:t>Edw</a:t>
-            </a:r>
-            <a:r>
-              <a:rPr lang="en-US" dirty="0"/>
-              <a:t> bands plot the containment fractions from simulated data compared with analytical </a:t>
-            </a:r>
-            <a:r>
-              <a:rPr lang="en-US" dirty="0" err="1"/>
-              <a:t>calcs</a:t>
-            </a:r>
-            <a:r>
-              <a:rPr lang="en-US" dirty="0"/>
-              <a:t>.</a:t>
-            </a:r>
-          </a:p>
-          <a:p>
-            <a:pPr marL="342900" indent="-342900">
-              <a:buFont typeface="+mj-lt"/>
-              <a:buAutoNum type="arabicPeriod"/>
-            </a:pPr>
-            <a:r>
-              <a:rPr lang="en-US" dirty="0"/>
-              <a:t>Impact on DM searches? – extrapolation to low masses. </a:t>
-            </a:r>
-          </a:p>
-          <a:p>
-            <a:endParaRPr lang="en-US" dirty="0"/>
-          </a:p>
-          <a:p>
-            <a:r>
-              <a:rPr lang="en-US" dirty="0"/>
-              <a:t>Appendix:</a:t>
-            </a:r>
-          </a:p>
-          <a:p>
-            <a:endParaRPr lang="en-US" dirty="0"/>
-          </a:p>
-          <a:p>
-            <a:pPr marL="342900" indent="-342900">
-              <a:buFont typeface="+mj-lt"/>
-              <a:buAutoNum type="arabicPeriod"/>
-            </a:pPr>
-            <a:r>
-              <a:rPr lang="en-US" dirty="0"/>
-              <a:t>Appendix on Distribution calculations</a:t>
-            </a:r>
-          </a:p>
-          <a:p>
-            <a:pPr marL="342900" indent="-342900">
-              <a:buFont typeface="+mj-lt"/>
-              <a:buAutoNum type="arabicPeriod"/>
-            </a:pPr>
-            <a:r>
-              <a:rPr lang="en-US" dirty="0"/>
-              <a:t>Conversion of yield calculations to </a:t>
-            </a:r>
-            <a:r>
-              <a:rPr lang="en-US" dirty="0" err="1"/>
-              <a:t>Enr</a:t>
-            </a:r>
-            <a:r>
-              <a:rPr lang="en-US" dirty="0"/>
-              <a:t>-yield plane (not for paper)</a:t>
-            </a:r>
-          </a:p>
-          <a:p>
-            <a:pPr marL="342900" indent="-342900">
-              <a:buFont typeface="+mj-lt"/>
-              <a:buAutoNum type="arabicPeriod"/>
-            </a:pPr>
-            <a:r>
-              <a:rPr lang="en-US" dirty="0"/>
-              <a:t>Fit to CDMS yield bands to get CDMS resolutions</a:t>
-            </a:r>
+      <mc:AlternateContent xmlns:mc="http://schemas.openxmlformats.org/markup-compatibility/2006">
+        <mc:Choice xmlns:a14="http://schemas.microsoft.com/office/drawing/2010/main" Requires="a14">
+          <p:sp>
+            <p:nvSpPr>
+              <p:cNvPr id="3" name="TextBox 2">
+                <a:extLst>
+                  <a:ext uri="{FF2B5EF4-FFF2-40B4-BE49-F238E27FC236}">
+                    <a16:creationId xmlns:a16="http://schemas.microsoft.com/office/drawing/2014/main" id="{E75A5DD0-7A67-A943-9F4D-77B67FDA397C}"/>
+                  </a:ext>
+                </a:extLst>
+              </p:cNvPr>
+              <p:cNvSpPr txBox="1"/>
+              <p:nvPr/>
+            </p:nvSpPr>
+            <p:spPr>
+              <a:xfrm>
+                <a:off x="838200" y="1690688"/>
+                <a:ext cx="10964917" cy="3693319"/>
+              </a:xfrm>
+              <a:prstGeom prst="rect">
+                <a:avLst/>
+              </a:prstGeom>
+              <a:noFill/>
+            </p:spPr>
+            <p:txBody>
+              <a:bodyPr wrap="square" rtlCol="0">
+                <a:spAutoFit/>
+              </a:bodyPr>
+              <a:lstStyle/>
+              <a:p>
+                <a:pPr marL="342900" indent="-342900">
+                  <a:buFont typeface="+mj-lt"/>
+                  <a:buAutoNum type="arabicPeriod"/>
+                </a:pPr>
+                <a:r>
+                  <a:rPr lang="en-US" dirty="0"/>
+                  <a:t>Introduction to charge-producing devices for NR measurements and Fano importance</a:t>
+                </a:r>
+              </a:p>
+              <a:p>
+                <a:pPr marL="342900" indent="-342900">
+                  <a:buFont typeface="+mj-lt"/>
+                  <a:buAutoNum type="arabicPeriod"/>
+                </a:pPr>
+                <a:r>
+                  <a:rPr lang="en-US" dirty="0">
+                    <a:solidFill>
+                      <a:schemeClr val="accent6"/>
+                    </a:solidFill>
+                  </a:rPr>
+                  <a:t>Comparison of Dougherty data and </a:t>
+                </a:r>
+                <a:r>
+                  <a:rPr lang="en-US" dirty="0" err="1">
+                    <a:solidFill>
+                      <a:schemeClr val="accent6"/>
+                    </a:solidFill>
+                  </a:rPr>
+                  <a:t>Lindhard</a:t>
+                </a:r>
+                <a:r>
+                  <a:rPr lang="en-US" dirty="0">
+                    <a:solidFill>
+                      <a:schemeClr val="accent6"/>
+                    </a:solidFill>
+                  </a:rPr>
+                  <a:t> variance </a:t>
+                </a:r>
+              </a:p>
+              <a:p>
+                <a:pPr marL="342900" indent="-342900">
+                  <a:buFont typeface="+mj-lt"/>
+                  <a:buAutoNum type="arabicPeriod"/>
+                </a:pPr>
+                <a:r>
+                  <a:rPr lang="en-US" dirty="0"/>
+                  <a:t>Error estimation on ”C” </a:t>
+                </a:r>
+              </a:p>
+              <a:p>
+                <a:pPr marL="342900" indent="-342900">
+                  <a:buFont typeface="+mj-lt"/>
+                  <a:buAutoNum type="arabicPeriod"/>
+                </a:pPr>
+                <a:r>
+                  <a:rPr lang="en-US" dirty="0"/>
+                  <a:t>Text and analysis of MS simulations, try to quantify in terms of the MS contribution to C</a:t>
+                </a:r>
+              </a:p>
+              <a:p>
+                <a:pPr marL="342900" indent="-342900">
+                  <a:buFont typeface="+mj-lt"/>
+                  <a:buAutoNum type="arabicPeriod"/>
+                </a:pPr>
+                <a:r>
+                  <a:rPr lang="en-US" dirty="0"/>
+                  <a:t>Extraction of Edelweiss “F” with error</a:t>
+                </a:r>
+              </a:p>
+              <a:p>
+                <a:pPr marL="342900" indent="-342900">
+                  <a:buFont typeface="+mj-lt"/>
+                  <a:buAutoNum type="arabicPeriod"/>
+                </a:pPr>
+                <a:r>
+                  <a:rPr lang="en-US" dirty="0"/>
+                  <a:t>Use random simulation with </a:t>
+                </a:r>
+                <a:r>
+                  <a:rPr lang="en-US" dirty="0" err="1"/>
+                  <a:t>Edw</a:t>
+                </a:r>
+                <a:r>
+                  <a:rPr lang="en-US" dirty="0"/>
+                  <a:t> ”F” to get containment fraction for 3</a:t>
+                </a:r>
+                <a14:m>
+                  <m:oMath xmlns:m="http://schemas.openxmlformats.org/officeDocument/2006/math">
+                    <m:r>
+                      <a:rPr lang="en-US" b="0" i="1" smtClean="0">
+                        <a:latin typeface="Cambria Math" panose="02040503050406030204" pitchFamily="18" charset="0"/>
+                      </a:rPr>
+                      <m:t>𝜎</m:t>
+                    </m:r>
+                  </m:oMath>
+                </a14:m>
+                <a:r>
+                  <a:rPr lang="en-US" dirty="0"/>
+                  <a:t> Edw. NR band, show ER containment is plausible with F=0</a:t>
+                </a:r>
+              </a:p>
+              <a:p>
+                <a:pPr marL="342900" indent="-342900">
+                  <a:buFont typeface="+mj-lt"/>
+                  <a:buAutoNum type="arabicPeriod"/>
+                </a:pPr>
+                <a:r>
+                  <a:rPr lang="en-US" dirty="0"/>
+                  <a:t>Impact on low-mass DM projections for searches in Ep/</a:t>
+                </a:r>
+                <a:r>
+                  <a:rPr lang="en-US" dirty="0" err="1"/>
+                  <a:t>Eq</a:t>
+                </a:r>
+                <a:r>
+                  <a:rPr lang="en-US" dirty="0"/>
+                  <a:t> plane, for various voltages?</a:t>
+                </a:r>
+              </a:p>
+              <a:p>
+                <a:endParaRPr lang="en-US" dirty="0"/>
+              </a:p>
+              <a:p>
+                <a:r>
+                  <a:rPr lang="en-US" dirty="0"/>
+                  <a:t>Appendix:</a:t>
+                </a:r>
+              </a:p>
+              <a:p>
+                <a:endParaRPr lang="en-US" dirty="0"/>
+              </a:p>
+              <a:p>
+                <a:pPr marL="342900" indent="-342900">
+                  <a:buFont typeface="+mj-lt"/>
+                  <a:buAutoNum type="arabicPeriod"/>
+                </a:pPr>
+                <a:r>
+                  <a:rPr lang="en-US" dirty="0"/>
+                  <a:t>Appendix on Distribution calculations</a:t>
+                </a:r>
+              </a:p>
+              <a:p>
+                <a:pPr marL="342900" indent="-342900">
+                  <a:buFont typeface="+mj-lt"/>
+                  <a:buAutoNum type="arabicPeriod"/>
+                </a:pPr>
+                <a:r>
+                  <a:rPr lang="en-US" dirty="0"/>
+                  <a:t>Conversion of yield calculations to </a:t>
+                </a:r>
+                <a:r>
+                  <a:rPr lang="en-US" dirty="0" err="1"/>
+                  <a:t>Enr</a:t>
+                </a:r>
+                <a:r>
+                  <a:rPr lang="en-US" dirty="0"/>
+                  <a:t>-yield plane (not for paper)</a:t>
+                </a:r>
+              </a:p>
+            </p:txBody>
+          </p:sp>
+        </mc:Choice>
+        <mc:Fallback>
+          <p:sp>
+            <p:nvSpPr>
+              <p:cNvPr id="3" name="TextBox 2">
+                <a:extLst>
+                  <a:ext uri="{FF2B5EF4-FFF2-40B4-BE49-F238E27FC236}">
+                    <a16:creationId xmlns:a16="http://schemas.microsoft.com/office/drawing/2014/main" id="{E75A5DD0-7A67-A943-9F4D-77B67FDA397C}"/>
+                  </a:ext>
+                </a:extLst>
+              </p:cNvPr>
+              <p:cNvSpPr txBox="1">
+                <a:spLocks noRot="1" noChangeAspect="1" noMove="1" noResize="1" noEditPoints="1" noAdjustHandles="1" noChangeArrowheads="1" noChangeShapeType="1" noTextEdit="1"/>
+              </p:cNvSpPr>
+              <p:nvPr/>
+            </p:nvSpPr>
+            <p:spPr>
+              <a:xfrm>
+                <a:off x="838200" y="1690688"/>
+                <a:ext cx="10964917" cy="3693319"/>
+              </a:xfrm>
+              <a:prstGeom prst="rect">
+                <a:avLst/>
+              </a:prstGeom>
+              <a:blipFill>
+                <a:blip r:embed="rId2"/>
+                <a:stretch>
+                  <a:fillRect l="-463" t="-342" b="-1712"/>
+                </a:stretch>
+              </a:blipFill>
+            </p:spPr>
+            <p:txBody>
+              <a:bodyPr/>
+              <a:lstStyle/>
+              <a:p>
+                <a:r>
+                  <a:rPr lang="en-US">
+                    <a:noFill/>
+                  </a:rPr>
+                  <a:t> </a:t>
+                </a:r>
+              </a:p>
+            </p:txBody>
+          </p:sp>
+        </mc:Fallback>
+      </mc:AlternateContent>
+      <p:sp>
+        <p:nvSpPr>
+          <p:cNvPr id="4" name="Slide Number Placeholder 3">
+            <a:extLst>
+              <a:ext uri="{FF2B5EF4-FFF2-40B4-BE49-F238E27FC236}">
+                <a16:creationId xmlns:a16="http://schemas.microsoft.com/office/drawing/2014/main" id="{761413B5-E245-BA43-8C12-03E7318ADAE6}"/>
+              </a:ext>
+            </a:extLst>
+          </p:cNvPr>
+          <p:cNvSpPr>
+            <a:spLocks noGrp="1"/>
+          </p:cNvSpPr>
+          <p:nvPr>
+            <p:ph type="sldNum" sz="quarter" idx="12"/>
+          </p:nvPr>
+        </p:nvSpPr>
+        <p:spPr/>
+        <p:txBody>
+          <a:bodyPr/>
+          <a:lstStyle/>
+          <a:p>
+            <a:fld id="{9635BD54-6FD1-A547-8020-DE8D1AE33416}" type="slidenum">
+              <a:rPr lang="en-US" smtClean="0"/>
+              <a:t>3</a:t>
+            </a:fld>
+            <a:endParaRPr lang="en-US"/>
           </a:p>
         </p:txBody>
       </p:sp>
@@ -3838,6 +4287,132 @@
 </file>
 
 <file path=ppt/slides/slide4.xml><?xml version="1.0" encoding="utf-8"?>
+<p:sld xmlns:a="http://schemas.openxmlformats.org/drawingml/2006/main" xmlns:r="http://schemas.openxmlformats.org/officeDocument/2006/relationships" xmlns:p="http://schemas.openxmlformats.org/presentationml/2006/main">
+  <p:cSld>
+    <p:spTree>
+      <p:nvGrpSpPr>
+        <p:cNvPr id="1" name=""/>
+        <p:cNvGrpSpPr/>
+        <p:nvPr/>
+      </p:nvGrpSpPr>
+      <p:grpSpPr>
+        <a:xfrm>
+          <a:off x="0" y="0"/>
+          <a:ext cx="0" cy="0"/>
+          <a:chOff x="0" y="0"/>
+          <a:chExt cx="0" cy="0"/>
+        </a:xfrm>
+      </p:grpSpPr>
+      <p:sp>
+        <p:nvSpPr>
+          <p:cNvPr id="2" name="Title 1">
+            <a:extLst>
+              <a:ext uri="{FF2B5EF4-FFF2-40B4-BE49-F238E27FC236}">
+                <a16:creationId xmlns:a16="http://schemas.microsoft.com/office/drawing/2014/main" id="{368F9A84-CB96-414E-A8F7-8F56FA756142}"/>
+              </a:ext>
+            </a:extLst>
+          </p:cNvPr>
+          <p:cNvSpPr>
+            <a:spLocks noGrp="1"/>
+          </p:cNvSpPr>
+          <p:nvPr>
+            <p:ph type="title"/>
+          </p:nvPr>
+        </p:nvSpPr>
+        <p:spPr/>
+        <p:txBody>
+          <a:bodyPr/>
+          <a:lstStyle/>
+          <a:p>
+            <a:r>
+              <a:rPr lang="en-US" dirty="0"/>
+              <a:t>Error estimation on Edw. “C”</a:t>
+            </a:r>
+          </a:p>
+        </p:txBody>
+      </p:sp>
+      <p:sp>
+        <p:nvSpPr>
+          <p:cNvPr id="3" name="TextBox 2">
+            <a:extLst>
+              <a:ext uri="{FF2B5EF4-FFF2-40B4-BE49-F238E27FC236}">
+                <a16:creationId xmlns:a16="http://schemas.microsoft.com/office/drawing/2014/main" id="{E75A5DD0-7A67-A943-9F4D-77B67FDA397C}"/>
+              </a:ext>
+            </a:extLst>
+          </p:cNvPr>
+          <p:cNvSpPr txBox="1"/>
+          <p:nvPr/>
+        </p:nvSpPr>
+        <p:spPr>
+          <a:xfrm>
+            <a:off x="838200" y="1690688"/>
+            <a:ext cx="1441613" cy="369332"/>
+          </a:xfrm>
+          <a:prstGeom prst="rect">
+            <a:avLst/>
+          </a:prstGeom>
+          <a:noFill/>
+        </p:spPr>
+        <p:txBody>
+          <a:bodyPr wrap="none" rtlCol="0">
+            <a:spAutoFit/>
+          </a:bodyPr>
+          <a:lstStyle/>
+          <a:p>
+            <a:pPr marL="342900" indent="-342900">
+              <a:buFont typeface="+mj-lt"/>
+              <a:buAutoNum type="arabicPeriod"/>
+            </a:pPr>
+            <a:r>
+              <a:rPr lang="en-US" dirty="0"/>
+              <a:t>Calculate </a:t>
+            </a:r>
+          </a:p>
+        </p:txBody>
+      </p:sp>
+      <p:sp>
+        <p:nvSpPr>
+          <p:cNvPr id="4" name="Slide Number Placeholder 3">
+            <a:extLst>
+              <a:ext uri="{FF2B5EF4-FFF2-40B4-BE49-F238E27FC236}">
+                <a16:creationId xmlns:a16="http://schemas.microsoft.com/office/drawing/2014/main" id="{D60BCC59-2EE7-3049-9677-639049C95AC1}"/>
+              </a:ext>
+            </a:extLst>
+          </p:cNvPr>
+          <p:cNvSpPr>
+            <a:spLocks noGrp="1"/>
+          </p:cNvSpPr>
+          <p:nvPr>
+            <p:ph type="sldNum" sz="quarter" idx="12"/>
+          </p:nvPr>
+        </p:nvSpPr>
+        <p:spPr/>
+        <p:txBody>
+          <a:bodyPr/>
+          <a:lstStyle/>
+          <a:p>
+            <a:fld id="{9635BD54-6FD1-A547-8020-DE8D1AE33416}" type="slidenum">
+              <a:rPr lang="en-US" smtClean="0"/>
+              <a:t>4</a:t>
+            </a:fld>
+            <a:endParaRPr lang="en-US"/>
+          </a:p>
+        </p:txBody>
+      </p:sp>
+    </p:spTree>
+    <p:extLst>
+      <p:ext uri="{BB962C8B-B14F-4D97-AF65-F5344CB8AC3E}">
+        <p14:creationId xmlns:p14="http://schemas.microsoft.com/office/powerpoint/2010/main" val="2994318958"/>
+      </p:ext>
+    </p:extLst>
+  </p:cSld>
+  <p:clrMapOvr>
+    <a:masterClrMapping/>
+  </p:clrMapOvr>
+</p:sld>
+</file>
+
+<file path=ppt/slides/slide5.xml><?xml version="1.0" encoding="utf-8"?>
 <p:sld xmlns:a="http://schemas.openxmlformats.org/drawingml/2006/main" xmlns:r="http://schemas.openxmlformats.org/officeDocument/2006/relationships" xmlns:p="http://schemas.openxmlformats.org/presentationml/2006/main">
   <p:cSld>
     <p:spTree>
@@ -4161,10 +4736,39 @@
           </p:sp>
         </mc:Fallback>
       </mc:AlternateContent>
+      <p:sp>
+        <p:nvSpPr>
+          <p:cNvPr id="4" name="Slide Number Placeholder 3">
+            <a:extLst>
+              <a:ext uri="{FF2B5EF4-FFF2-40B4-BE49-F238E27FC236}">
+                <a16:creationId xmlns:a16="http://schemas.microsoft.com/office/drawing/2014/main" id="{D60BCC59-2EE7-3049-9677-639049C95AC1}"/>
+              </a:ext>
+            </a:extLst>
+          </p:cNvPr>
+          <p:cNvSpPr>
+            <a:spLocks noGrp="1"/>
+          </p:cNvSpPr>
+          <p:nvPr>
+            <p:ph type="sldNum" sz="quarter" idx="12"/>
+          </p:nvPr>
+        </p:nvSpPr>
+        <p:spPr/>
+        <p:txBody>
+          <a:bodyPr/>
+          <a:lstStyle/>
+          <a:p>
+            <a:fld id="{9635BD54-6FD1-A547-8020-DE8D1AE33416}" type="slidenum">
+              <a:rPr lang="en-US" smtClean="0"/>
+              <a:t>5</a:t>
+            </a:fld>
+            <a:endParaRPr lang="en-US"/>
+          </a:p>
+        </p:txBody>
+      </p:sp>
     </p:spTree>
     <p:extLst>
       <p:ext uri="{BB962C8B-B14F-4D97-AF65-F5344CB8AC3E}">
-        <p14:creationId xmlns:p14="http://schemas.microsoft.com/office/powerpoint/2010/main" val="2994318958"/>
+        <p14:creationId xmlns:p14="http://schemas.microsoft.com/office/powerpoint/2010/main" val="1547071749"/>
       </p:ext>
     </p:extLst>
   </p:cSld>
@@ -4174,7 +4778,7 @@
 </p:sld>
 </file>
 
-<file path=ppt/slides/slide5.xml><?xml version="1.0" encoding="utf-8"?>
+<file path=ppt/slides/slide6.xml><?xml version="1.0" encoding="utf-8"?>
 <p:sld xmlns:a="http://schemas.openxmlformats.org/drawingml/2006/main" xmlns:r="http://schemas.openxmlformats.org/officeDocument/2006/relationships" xmlns:p="http://schemas.openxmlformats.org/presentationml/2006/main">
   <p:cSld>
     <p:spTree>
@@ -4397,6 +5001,35 @@
           </p:sp>
         </mc:Fallback>
       </mc:AlternateContent>
+      <p:sp>
+        <p:nvSpPr>
+          <p:cNvPr id="4" name="Slide Number Placeholder 3">
+            <a:extLst>
+              <a:ext uri="{FF2B5EF4-FFF2-40B4-BE49-F238E27FC236}">
+                <a16:creationId xmlns:a16="http://schemas.microsoft.com/office/drawing/2014/main" id="{7B92F235-38CA-9D4B-A4A1-16A28B0D21A6}"/>
+              </a:ext>
+            </a:extLst>
+          </p:cNvPr>
+          <p:cNvSpPr>
+            <a:spLocks noGrp="1"/>
+          </p:cNvSpPr>
+          <p:nvPr>
+            <p:ph type="sldNum" sz="quarter" idx="12"/>
+          </p:nvPr>
+        </p:nvSpPr>
+        <p:spPr/>
+        <p:txBody>
+          <a:bodyPr/>
+          <a:lstStyle/>
+          <a:p>
+            <a:fld id="{9635BD54-6FD1-A547-8020-DE8D1AE33416}" type="slidenum">
+              <a:rPr lang="en-US" smtClean="0"/>
+              <a:t>6</a:t>
+            </a:fld>
+            <a:endParaRPr lang="en-US"/>
+          </a:p>
+        </p:txBody>
+      </p:sp>
     </p:spTree>
     <p:extLst>
       <p:ext uri="{BB962C8B-B14F-4D97-AF65-F5344CB8AC3E}">
@@ -4703,4 +5336,299 @@
     </a:ext>
   </a:extLst>
 </a:theme>
+</file>
+
+<file path=ppt/theme/theme2.xml><?xml version="1.0" encoding="utf-8"?>
+<a:theme xmlns:a="http://schemas.openxmlformats.org/drawingml/2006/main" name="Office Theme">
+  <a:themeElements>
+    <a:clrScheme name="Office">
+      <a:dk1>
+        <a:sysClr val="windowText" lastClr="000000"/>
+      </a:dk1>
+      <a:lt1>
+        <a:sysClr val="window" lastClr="FFFFFF"/>
+      </a:lt1>
+      <a:dk2>
+        <a:srgbClr val="44546A"/>
+      </a:dk2>
+      <a:lt2>
+        <a:srgbClr val="E7E6E6"/>
+      </a:lt2>
+      <a:accent1>
+        <a:srgbClr val="4472C4"/>
+      </a:accent1>
+      <a:accent2>
+        <a:srgbClr val="ED7D31"/>
+      </a:accent2>
+      <a:accent3>
+        <a:srgbClr val="A5A5A5"/>
+      </a:accent3>
+      <a:accent4>
+        <a:srgbClr val="FFC000"/>
+      </a:accent4>
+      <a:accent5>
+        <a:srgbClr val="5B9BD5"/>
+      </a:accent5>
+      <a:accent6>
+        <a:srgbClr val="70AD47"/>
+      </a:accent6>
+      <a:hlink>
+        <a:srgbClr val="0563C1"/>
+      </a:hlink>
+      <a:folHlink>
+        <a:srgbClr val="954F72"/>
+      </a:folHlink>
+    </a:clrScheme>
+    <a:fontScheme name="Office">
+      <a:majorFont>
+        <a:latin typeface="Calibri Light" panose="020F0302020204030204"/>
+        <a:ea typeface=""/>
+        <a:cs typeface=""/>
+        <a:font script="Jpan" typeface="游ゴシック Light"/>
+        <a:font script="Hang" typeface="맑은 고딕"/>
+        <a:font script="Hans" typeface="等线 Light"/>
+        <a:font script="Hant" typeface="新細明體"/>
+        <a:font script="Arab" typeface="Times New Roman"/>
+        <a:font script="Hebr" typeface="Times New Roman"/>
+        <a:font script="Thai" typeface="Angsana New"/>
+        <a:font script="Ethi" typeface="Nyala"/>
+        <a:font script="Beng" typeface="Vrinda"/>
+        <a:font script="Gujr" typeface="Shruti"/>
+        <a:font script="Khmr" typeface="MoolBoran"/>
+        <a:font script="Knda" typeface="Tunga"/>
+        <a:font script="Guru" typeface="Raavi"/>
+        <a:font script="Cans" typeface="Euphemia"/>
+        <a:font script="Cher" typeface="Plantagenet Cherokee"/>
+        <a:font script="Yiii" typeface="Microsoft Yi Baiti"/>
+        <a:font script="Tibt" typeface="Microsoft Himalaya"/>
+        <a:font script="Thaa" typeface="MV Boli"/>
+        <a:font script="Deva" typeface="Mangal"/>
+        <a:font script="Telu" typeface="Gautami"/>
+        <a:font script="Taml" typeface="Latha"/>
+        <a:font script="Syrc" typeface="Estrangelo Edessa"/>
+        <a:font script="Orya" typeface="Kalinga"/>
+        <a:font script="Mlym" typeface="Kartika"/>
+        <a:font script="Laoo" typeface="DokChampa"/>
+        <a:font script="Sinh" typeface="Iskoola Pota"/>
+        <a:font script="Mong" typeface="Mongolian Baiti"/>
+        <a:font script="Viet" typeface="Times New Roman"/>
+        <a:font script="Uigh" typeface="Microsoft Uighur"/>
+        <a:font script="Geor" typeface="Sylfaen"/>
+        <a:font script="Armn" typeface="Arial"/>
+        <a:font script="Bugi" typeface="Leelawadee UI"/>
+        <a:font script="Bopo" typeface="Microsoft JhengHei"/>
+        <a:font script="Java" typeface="Javanese Text"/>
+        <a:font script="Lisu" typeface="Segoe UI"/>
+        <a:font script="Mymr" typeface="Myanmar Text"/>
+        <a:font script="Nkoo" typeface="Ebrima"/>
+        <a:font script="Olck" typeface="Nirmala UI"/>
+        <a:font script="Osma" typeface="Ebrima"/>
+        <a:font script="Phag" typeface="Phagspa"/>
+        <a:font script="Syrn" typeface="Estrangelo Edessa"/>
+        <a:font script="Syrj" typeface="Estrangelo Edessa"/>
+        <a:font script="Syre" typeface="Estrangelo Edessa"/>
+        <a:font script="Sora" typeface="Nirmala UI"/>
+        <a:font script="Tale" typeface="Microsoft Tai Le"/>
+        <a:font script="Talu" typeface="Microsoft New Tai Lue"/>
+        <a:font script="Tfng" typeface="Ebrima"/>
+      </a:majorFont>
+      <a:minorFont>
+        <a:latin typeface="Calibri" panose="020F0502020204030204"/>
+        <a:ea typeface=""/>
+        <a:cs typeface=""/>
+        <a:font script="Jpan" typeface="游ゴシック"/>
+        <a:font script="Hang" typeface="맑은 고딕"/>
+        <a:font script="Hans" typeface="等线"/>
+        <a:font script="Hant" typeface="新細明體"/>
+        <a:font script="Arab" typeface="Arial"/>
+        <a:font script="Hebr" typeface="Arial"/>
+        <a:font script="Thai" typeface="Cordia New"/>
+        <a:font script="Ethi" typeface="Nyala"/>
+        <a:font script="Beng" typeface="Vrinda"/>
+        <a:font script="Gujr" typeface="Shruti"/>
+        <a:font script="Khmr" typeface="DaunPenh"/>
+        <a:font script="Knda" typeface="Tunga"/>
+        <a:font script="Guru" typeface="Raavi"/>
+        <a:font script="Cans" typeface="Euphemia"/>
+        <a:font script="Cher" typeface="Plantagenet Cherokee"/>
+        <a:font script="Yiii" typeface="Microsoft Yi Baiti"/>
+        <a:font script="Tibt" typeface="Microsoft Himalaya"/>
+        <a:font script="Thaa" typeface="MV Boli"/>
+        <a:font script="Deva" typeface="Mangal"/>
+        <a:font script="Telu" typeface="Gautami"/>
+        <a:font script="Taml" typeface="Latha"/>
+        <a:font script="Syrc" typeface="Estrangelo Edessa"/>
+        <a:font script="Orya" typeface="Kalinga"/>
+        <a:font script="Mlym" typeface="Kartika"/>
+        <a:font script="Laoo" typeface="DokChampa"/>
+        <a:font script="Sinh" typeface="Iskoola Pota"/>
+        <a:font script="Mong" typeface="Mongolian Baiti"/>
+        <a:font script="Viet" typeface="Arial"/>
+        <a:font script="Uigh" typeface="Microsoft Uighur"/>
+        <a:font script="Geor" typeface="Sylfaen"/>
+        <a:font script="Armn" typeface="Arial"/>
+        <a:font script="Bugi" typeface="Leelawadee UI"/>
+        <a:font script="Bopo" typeface="Microsoft JhengHei"/>
+        <a:font script="Java" typeface="Javanese Text"/>
+        <a:font script="Lisu" typeface="Segoe UI"/>
+        <a:font script="Mymr" typeface="Myanmar Text"/>
+        <a:font script="Nkoo" typeface="Ebrima"/>
+        <a:font script="Olck" typeface="Nirmala UI"/>
+        <a:font script="Osma" typeface="Ebrima"/>
+        <a:font script="Phag" typeface="Phagspa"/>
+        <a:font script="Syrn" typeface="Estrangelo Edessa"/>
+        <a:font script="Syrj" typeface="Estrangelo Edessa"/>
+        <a:font script="Syre" typeface="Estrangelo Edessa"/>
+        <a:font script="Sora" typeface="Nirmala UI"/>
+        <a:font script="Tale" typeface="Microsoft Tai Le"/>
+        <a:font script="Talu" typeface="Microsoft New Tai Lue"/>
+        <a:font script="Tfng" typeface="Ebrima"/>
+      </a:minorFont>
+    </a:fontScheme>
+    <a:fmtScheme name="Office">
+      <a:fillStyleLst>
+        <a:solidFill>
+          <a:schemeClr val="phClr"/>
+        </a:solidFill>
+        <a:gradFill rotWithShape="1">
+          <a:gsLst>
+            <a:gs pos="0">
+              <a:schemeClr val="phClr">
+                <a:lumMod val="110000"/>
+                <a:satMod val="105000"/>
+                <a:tint val="67000"/>
+              </a:schemeClr>
+            </a:gs>
+            <a:gs pos="50000">
+              <a:schemeClr val="phClr">
+                <a:lumMod val="105000"/>
+                <a:satMod val="103000"/>
+                <a:tint val="73000"/>
+              </a:schemeClr>
+            </a:gs>
+            <a:gs pos="100000">
+              <a:schemeClr val="phClr">
+                <a:lumMod val="105000"/>
+                <a:satMod val="109000"/>
+                <a:tint val="81000"/>
+              </a:schemeClr>
+            </a:gs>
+          </a:gsLst>
+          <a:lin ang="5400000" scaled="0"/>
+        </a:gradFill>
+        <a:gradFill rotWithShape="1">
+          <a:gsLst>
+            <a:gs pos="0">
+              <a:schemeClr val="phClr">
+                <a:satMod val="103000"/>
+                <a:lumMod val="102000"/>
+                <a:tint val="94000"/>
+              </a:schemeClr>
+            </a:gs>
+            <a:gs pos="50000">
+              <a:schemeClr val="phClr">
+                <a:satMod val="110000"/>
+                <a:lumMod val="100000"/>
+                <a:shade val="100000"/>
+              </a:schemeClr>
+            </a:gs>
+            <a:gs pos="100000">
+              <a:schemeClr val="phClr">
+                <a:lumMod val="99000"/>
+                <a:satMod val="120000"/>
+                <a:shade val="78000"/>
+              </a:schemeClr>
+            </a:gs>
+          </a:gsLst>
+          <a:lin ang="5400000" scaled="0"/>
+        </a:gradFill>
+      </a:fillStyleLst>
+      <a:lnStyleLst>
+        <a:ln w="6350" cap="flat" cmpd="sng" algn="ctr">
+          <a:solidFill>
+            <a:schemeClr val="phClr"/>
+          </a:solidFill>
+          <a:prstDash val="solid"/>
+          <a:miter lim="800000"/>
+        </a:ln>
+        <a:ln w="12700" cap="flat" cmpd="sng" algn="ctr">
+          <a:solidFill>
+            <a:schemeClr val="phClr"/>
+          </a:solidFill>
+          <a:prstDash val="solid"/>
+          <a:miter lim="800000"/>
+        </a:ln>
+        <a:ln w="19050" cap="flat" cmpd="sng" algn="ctr">
+          <a:solidFill>
+            <a:schemeClr val="phClr"/>
+          </a:solidFill>
+          <a:prstDash val="solid"/>
+          <a:miter lim="800000"/>
+        </a:ln>
+      </a:lnStyleLst>
+      <a:effectStyleLst>
+        <a:effectStyle>
+          <a:effectLst/>
+        </a:effectStyle>
+        <a:effectStyle>
+          <a:effectLst/>
+        </a:effectStyle>
+        <a:effectStyle>
+          <a:effectLst>
+            <a:outerShdw blurRad="57150" dist="19050" dir="5400000" algn="ctr" rotWithShape="0">
+              <a:srgbClr val="000000">
+                <a:alpha val="63000"/>
+              </a:srgbClr>
+            </a:outerShdw>
+          </a:effectLst>
+        </a:effectStyle>
+      </a:effectStyleLst>
+      <a:bgFillStyleLst>
+        <a:solidFill>
+          <a:schemeClr val="phClr"/>
+        </a:solidFill>
+        <a:solidFill>
+          <a:schemeClr val="phClr">
+            <a:tint val="95000"/>
+            <a:satMod val="170000"/>
+          </a:schemeClr>
+        </a:solidFill>
+        <a:gradFill rotWithShape="1">
+          <a:gsLst>
+            <a:gs pos="0">
+              <a:schemeClr val="phClr">
+                <a:tint val="93000"/>
+                <a:satMod val="150000"/>
+                <a:shade val="98000"/>
+                <a:lumMod val="102000"/>
+              </a:schemeClr>
+            </a:gs>
+            <a:gs pos="50000">
+              <a:schemeClr val="phClr">
+                <a:tint val="98000"/>
+                <a:satMod val="130000"/>
+                <a:shade val="90000"/>
+                <a:lumMod val="103000"/>
+              </a:schemeClr>
+            </a:gs>
+            <a:gs pos="100000">
+              <a:schemeClr val="phClr">
+                <a:shade val="63000"/>
+                <a:satMod val="120000"/>
+              </a:schemeClr>
+            </a:gs>
+          </a:gsLst>
+          <a:lin ang="5400000" scaled="0"/>
+        </a:gradFill>
+      </a:bgFillStyleLst>
+    </a:fmtScheme>
+  </a:themeElements>
+  <a:objectDefaults/>
+  <a:extraClrSchemeLst/>
+  <a:extLst>
+    <a:ext uri="{05A4C25C-085E-4340-85A3-A5531E510DB2}">
+      <thm15:themeFamily xmlns:thm15="http://schemas.microsoft.com/office/thememl/2012/main" name="Office Theme" id="{62F939B6-93AF-4DB8-9C6B-D6C7DFDC589F}" vid="{4A3C46E8-61CC-4603-A589-7422A47A8E4A}"/>
+    </a:ext>
+  </a:extLst>
+</a:theme>
 </file>
</xml_diff>